<commit_message>
small changes to probleemstelling ppt
</commit_message>
<xml_diff>
--- a/Probleemstelling/Draft_ppt.pptx
+++ b/Probleemstelling/Draft_ppt.pptx
@@ -225,7 +225,7 @@
           <a:p>
             <a:fld id="{8F591CCF-F6FD-734B-854A-5BC033593B1E}" type="datetimeFigureOut">
               <a:rPr lang="nl-NL" smtClean="0"/>
-              <a:t>30-11-2020</a:t>
+              <a:t>3-12-2020</a:t>
             </a:fld>
             <a:endParaRPr lang="nl-NL"/>
           </a:p>
@@ -291,7 +291,7 @@
           <a:p>
             <a:fld id="{E152A6D4-CD3D-5148-8B70-A84796F20135}" type="slidenum">
               <a:rPr lang="nl-NL" smtClean="0"/>
-              <a:t>‹#›</a:t>
+              <a:t>‹nr.›</a:t>
             </a:fld>
             <a:endParaRPr lang="nl-NL"/>
           </a:p>
@@ -390,7 +390,7 @@
           <a:p>
             <a:fld id="{23C66214-DB21-4647-B5DA-0D17CA592867}" type="datetimeFigureOut">
               <a:rPr lang="nl-NL" smtClean="0"/>
-              <a:t>30-11-2020</a:t>
+              <a:t>3-12-2020</a:t>
             </a:fld>
             <a:endParaRPr lang="nl-NL"/>
           </a:p>
@@ -548,7 +548,7 @@
           <a:p>
             <a:fld id="{8954E32A-327F-AF4B-8E1F-209FBF93D26D}" type="slidenum">
               <a:rPr lang="nl-NL" smtClean="0"/>
-              <a:t>‹#›</a:t>
+              <a:t>‹nr.›</a:t>
             </a:fld>
             <a:endParaRPr lang="nl-NL"/>
           </a:p>
@@ -1379,7 +1379,7 @@
           <a:p>
             <a:fld id="{AC3C5412-F5E6-4727-B44A-B2B5A84DB14A}" type="datetime1">
               <a:rPr lang="nl-BE" smtClean="0"/>
-              <a:t>30/11/2020</a:t>
+              <a:t>3/12/2020</a:t>
             </a:fld>
             <a:endParaRPr lang="nl-NL"/>
           </a:p>
@@ -1424,7 +1424,7 @@
           <a:p>
             <a:fld id="{CF179DAE-D0A6-40C3-B8BC-6A97C268D03A}" type="slidenum">
               <a:rPr lang="nl-NL" smtClean="0"/>
-              <a:t>‹#›</a:t>
+              <a:t>‹nr.›</a:t>
             </a:fld>
             <a:endParaRPr lang="nl-NL"/>
           </a:p>
@@ -1662,7 +1662,7 @@
           <a:p>
             <a:fld id="{E76EA1B4-471F-4916-AE0F-2FD9B1494989}" type="datetime1">
               <a:rPr lang="nl-BE" smtClean="0"/>
-              <a:t>30/11/2020</a:t>
+              <a:t>3/12/2020</a:t>
             </a:fld>
             <a:endParaRPr lang="nl-NL"/>
           </a:p>
@@ -1707,7 +1707,7 @@
           <a:p>
             <a:fld id="{CF179DAE-D0A6-40C3-B8BC-6A97C268D03A}" type="slidenum">
               <a:rPr lang="nl-NL" smtClean="0"/>
-              <a:t>‹#›</a:t>
+              <a:t>‹nr.›</a:t>
             </a:fld>
             <a:endParaRPr lang="nl-NL"/>
           </a:p>
@@ -1992,7 +1992,7 @@
           <a:p>
             <a:fld id="{0FDEE988-C9D1-4B41-906C-78E5525EC368}" type="datetime1">
               <a:rPr lang="nl-BE" smtClean="0"/>
-              <a:t>30/11/2020</a:t>
+              <a:t>3/12/2020</a:t>
             </a:fld>
             <a:endParaRPr lang="nl-NL"/>
           </a:p>
@@ -2037,7 +2037,7 @@
           <a:p>
             <a:fld id="{0A297500-7527-634B-90F4-69D0994C32B4}" type="slidenum">
               <a:rPr lang="nl-NL" smtClean="0"/>
-              <a:t>‹#›</a:t>
+              <a:t>‹nr.›</a:t>
             </a:fld>
             <a:endParaRPr lang="nl-NL"/>
           </a:p>
@@ -2311,7 +2311,7 @@
           <a:p>
             <a:fld id="{A4C630F9-6046-48DD-8107-A903A5265F2A}" type="datetime1">
               <a:rPr lang="nl-BE" smtClean="0"/>
-              <a:t>30/11/2020</a:t>
+              <a:t>3/12/2020</a:t>
             </a:fld>
             <a:endParaRPr lang="nl-NL" dirty="0"/>
           </a:p>
@@ -2356,7 +2356,7 @@
           <a:p>
             <a:fld id="{0A297500-7527-634B-90F4-69D0994C32B4}" type="slidenum">
               <a:rPr lang="nl-NL" smtClean="0"/>
-              <a:t>‹#›</a:t>
+              <a:t>‹nr.›</a:t>
             </a:fld>
             <a:endParaRPr lang="nl-NL"/>
           </a:p>
@@ -2632,7 +2632,7 @@
           <a:p>
             <a:fld id="{AB142135-2AF6-41F5-9559-B5C94669121A}" type="datetime1">
               <a:rPr lang="nl-BE" smtClean="0"/>
-              <a:t>30/11/2020</a:t>
+              <a:t>3/12/2020</a:t>
             </a:fld>
             <a:endParaRPr lang="nl-NL" dirty="0"/>
           </a:p>
@@ -2677,7 +2677,7 @@
           <a:p>
             <a:fld id="{0A297500-7527-634B-90F4-69D0994C32B4}" type="slidenum">
               <a:rPr lang="nl-NL" smtClean="0"/>
-              <a:t>‹#›</a:t>
+              <a:t>‹nr.›</a:t>
             </a:fld>
             <a:endParaRPr lang="nl-NL"/>
           </a:p>
@@ -2774,7 +2774,7 @@
           <a:p>
             <a:fld id="{D7817D78-F253-471B-BF0C-B3EA74829726}" type="datetime1">
               <a:rPr lang="nl-BE" smtClean="0"/>
-              <a:t>30/11/2020</a:t>
+              <a:t>3/12/2020</a:t>
             </a:fld>
             <a:endParaRPr lang="nl-NL"/>
           </a:p>
@@ -2819,7 +2819,7 @@
           <a:p>
             <a:fld id="{0A297500-7527-634B-90F4-69D0994C32B4}" type="slidenum">
               <a:rPr lang="nl-NL" smtClean="0"/>
-              <a:t>‹#›</a:t>
+              <a:t>‹nr.›</a:t>
             </a:fld>
             <a:endParaRPr lang="nl-NL"/>
           </a:p>
@@ -3258,7 +3258,7 @@
           <a:p>
             <a:fld id="{94374391-CFDB-4833-B504-DEFBE92512D1}" type="datetime1">
               <a:rPr lang="nl-BE" smtClean="0"/>
-              <a:t>30/11/2020</a:t>
+              <a:t>3/12/2020</a:t>
             </a:fld>
             <a:endParaRPr lang="nl-NL" dirty="0"/>
           </a:p>
@@ -3303,7 +3303,7 @@
           <a:p>
             <a:fld id="{0A297500-7527-634B-90F4-69D0994C32B4}" type="slidenum">
               <a:rPr lang="nl-NL" smtClean="0"/>
-              <a:t>‹#›</a:t>
+              <a:t>‹nr.›</a:t>
             </a:fld>
             <a:endParaRPr lang="nl-NL"/>
           </a:p>
@@ -3379,7 +3379,7 @@
           <a:p>
             <a:fld id="{D41C31F0-2B75-48AE-AEBC-9657DD1B0AB7}" type="datetime1">
               <a:rPr lang="nl-BE" smtClean="0"/>
-              <a:t>30/11/2020</a:t>
+              <a:t>3/12/2020</a:t>
             </a:fld>
             <a:endParaRPr lang="nl-NL"/>
           </a:p>
@@ -3424,7 +3424,7 @@
           <a:p>
             <a:fld id="{0A297500-7527-634B-90F4-69D0994C32B4}" type="slidenum">
               <a:rPr lang="nl-NL" smtClean="0"/>
-              <a:t>‹#›</a:t>
+              <a:t>‹nr.›</a:t>
             </a:fld>
             <a:endParaRPr lang="nl-NL"/>
           </a:p>
@@ -3500,7 +3500,7 @@
           <a:p>
             <a:fld id="{53F19495-32E9-486F-877E-DF8DCF8228E7}" type="datetime1">
               <a:rPr lang="nl-BE" smtClean="0"/>
-              <a:t>30/11/2020</a:t>
+              <a:t>3/12/2020</a:t>
             </a:fld>
             <a:endParaRPr lang="nl-NL"/>
           </a:p>
@@ -3545,7 +3545,7 @@
           <a:p>
             <a:fld id="{0A297500-7527-634B-90F4-69D0994C32B4}" type="slidenum">
               <a:rPr lang="nl-NL" smtClean="0"/>
-              <a:t>‹#›</a:t>
+              <a:t>‹nr.›</a:t>
             </a:fld>
             <a:endParaRPr lang="nl-NL"/>
           </a:p>
@@ -3682,7 +3682,7 @@
           <a:p>
             <a:fld id="{804A002D-00A0-4BF6-93D8-8D999BC8C748}" type="datetime1">
               <a:rPr lang="nl-BE" smtClean="0"/>
-              <a:t>30/11/2020</a:t>
+              <a:t>3/12/2020</a:t>
             </a:fld>
             <a:endParaRPr lang="nl-NL" dirty="0"/>
           </a:p>
@@ -3727,7 +3727,7 @@
           <a:p>
             <a:fld id="{0A297500-7527-634B-90F4-69D0994C32B4}" type="slidenum">
               <a:rPr lang="nl-NL" smtClean="0"/>
-              <a:t>‹#›</a:t>
+              <a:t>‹nr.›</a:t>
             </a:fld>
             <a:endParaRPr lang="nl-NL"/>
           </a:p>
@@ -3966,7 +3966,7 @@
           <a:p>
             <a:fld id="{75FF7ED8-F103-41E3-857E-CDC769C97DAE}" type="datetime1">
               <a:rPr lang="nl-BE" smtClean="0"/>
-              <a:t>30/11/2020</a:t>
+              <a:t>3/12/2020</a:t>
             </a:fld>
             <a:endParaRPr lang="nl-NL" dirty="0"/>
           </a:p>
@@ -4047,7 +4047,7 @@
             <a:fld id="{0A297500-7527-634B-90F4-69D0994C32B4}" type="slidenum">
               <a:rPr lang="nl-NL" smtClean="0"/>
               <a:pPr/>
-              <a:t>‹#›</a:t>
+              <a:t>‹nr.›</a:t>
             </a:fld>
             <a:endParaRPr lang="nl-NL" dirty="0"/>
           </a:p>
@@ -4607,7 +4607,7 @@
           <a:p>
             <a:fld id="{9F542F44-42ED-4221-90FD-ACE0C331DBA2}" type="datetime1">
               <a:rPr lang="nl-BE" smtClean="0"/>
-              <a:t>30/11/2020</a:t>
+              <a:t>3/12/2020</a:t>
             </a:fld>
             <a:endParaRPr lang="nl-NL" dirty="0"/>
           </a:p>
@@ -4688,7 +4688,7 @@
             <a:fld id="{0A297500-7527-634B-90F4-69D0994C32B4}" type="slidenum">
               <a:rPr lang="nl-NL" smtClean="0"/>
               <a:pPr/>
-              <a:t>‹#›</a:t>
+              <a:t>‹nr.›</a:t>
             </a:fld>
             <a:endParaRPr lang="nl-NL" dirty="0"/>
           </a:p>
@@ -5882,18 +5882,25 @@
           </a:lstStyle>
           <a:p>
             <a:r>
+              <a:rPr lang="en-US" dirty="0" err="1">
+                <a:latin typeface="Arial"/>
+                <a:cs typeface="Arial"/>
+              </a:rPr>
+              <a:t>Andere</a:t>
+            </a:r>
+            <a:r>
               <a:rPr lang="en-US" dirty="0">
                 <a:latin typeface="Arial"/>
                 <a:cs typeface="Arial"/>
               </a:rPr>
-              <a:t>Andere </a:t>
+              <a:t> </a:t>
             </a:r>
             <a:r>
               <a:rPr lang="en-US" dirty="0" err="1">
                 <a:latin typeface="Arial"/>
                 <a:cs typeface="Arial"/>
               </a:rPr>
-              <a:t>metaparameters</a:t>
+              <a:t>metaparameter</a:t>
             </a:r>
             <a:r>
               <a:rPr lang="en-US" dirty="0">
@@ -6029,7 +6036,7 @@
               </a:rPr>
               <a:t>?</a:t>
             </a:r>
-            <a:endParaRPr lang="en-US"/>
+            <a:endParaRPr lang="en-US" dirty="0"/>
           </a:p>
           <a:p>
             <a:endParaRPr lang="en-US" dirty="0">
@@ -6715,130 +6722,118 @@
               </a:rPr>
               <a:t>classificatie</a:t>
             </a:r>
-            <a:endParaRPr lang="en-US">
-              <a:latin typeface="Arial"/>
-              <a:cs typeface="Arial"/>
-            </a:endParaRPr>
-          </a:p>
-          <a:p>
-            <a:r>
-              <a:rPr lang="en-US" dirty="0" err="1">
-                <a:latin typeface="Arial"/>
-                <a:cs typeface="Arial"/>
-              </a:rPr>
-              <a:t>Vb</a:t>
-            </a:r>
-            <a:r>
-              <a:rPr lang="en-US" dirty="0">
-                <a:latin typeface="Arial"/>
-                <a:cs typeface="Arial"/>
-              </a:rPr>
-              <a:t>: </a:t>
-            </a:r>
-            <a:r>
-              <a:rPr lang="en-US" dirty="0" err="1">
-                <a:latin typeface="Arial"/>
-                <a:cs typeface="Arial"/>
-              </a:rPr>
-              <a:t>cirkel</a:t>
-            </a:r>
-            <a:r>
-              <a:rPr lang="en-US" dirty="0">
-                <a:latin typeface="Arial"/>
-                <a:cs typeface="Arial"/>
-              </a:rPr>
-              <a:t>, </a:t>
-            </a:r>
-            <a:r>
-              <a:rPr lang="en-US" dirty="0" err="1">
-                <a:latin typeface="Arial"/>
-                <a:cs typeface="Arial"/>
-              </a:rPr>
-              <a:t>driehoek</a:t>
-            </a:r>
-            <a:r>
-              <a:rPr lang="en-US" dirty="0">
-                <a:latin typeface="Arial"/>
-                <a:cs typeface="Arial"/>
-              </a:rPr>
-              <a:t>, </a:t>
-            </a:r>
-            <a:r>
-              <a:rPr lang="en-US" dirty="0" err="1">
-                <a:latin typeface="Arial"/>
-                <a:cs typeface="Arial"/>
-              </a:rPr>
-              <a:t>vijfhoek</a:t>
-            </a:r>
-            <a:endParaRPr lang="en-US">
-              <a:latin typeface="Arial"/>
-              <a:cs typeface="Arial"/>
-            </a:endParaRPr>
-          </a:p>
-          <a:p>
-            <a:r>
-              <a:rPr lang="en-US" dirty="0" err="1">
-                <a:latin typeface="Arial"/>
-                <a:cs typeface="Arial"/>
-              </a:rPr>
-              <a:t>Verschillende</a:t>
-            </a:r>
-            <a:r>
-              <a:rPr lang="en-US" dirty="0">
-                <a:latin typeface="Arial"/>
-                <a:cs typeface="Arial"/>
-              </a:rPr>
-              <a:t> </a:t>
-            </a:r>
-            <a:r>
-              <a:rPr lang="en-US" dirty="0" err="1">
-                <a:latin typeface="Arial"/>
-                <a:cs typeface="Arial"/>
-              </a:rPr>
-              <a:t>waarden</a:t>
-            </a:r>
-            <a:r>
-              <a:rPr lang="en-US" dirty="0">
-                <a:latin typeface="Arial"/>
-                <a:cs typeface="Arial"/>
-              </a:rPr>
-              <a:t> </a:t>
-            </a:r>
-            <a:r>
-              <a:rPr lang="en-US" dirty="0" err="1">
-                <a:latin typeface="Arial"/>
-                <a:cs typeface="Arial"/>
-              </a:rPr>
-              <a:t>voor</a:t>
-            </a:r>
-            <a:r>
-              <a:rPr lang="en-US" dirty="0">
-                <a:latin typeface="Arial"/>
-                <a:cs typeface="Arial"/>
-              </a:rPr>
-              <a:t> </a:t>
-            </a:r>
-            <a:r>
-              <a:rPr lang="en-US" dirty="0" err="1">
-                <a:latin typeface="Arial"/>
-                <a:cs typeface="Arial"/>
-              </a:rPr>
-              <a:t>metaparameters</a:t>
-            </a:r>
-          </a:p>
-          <a:p>
             <a:endParaRPr lang="en-US" dirty="0">
               <a:latin typeface="Arial"/>
               <a:cs typeface="Arial"/>
             </a:endParaRPr>
           </a:p>
           <a:p>
+            <a:r>
+              <a:rPr lang="en-US" dirty="0" err="1">
+                <a:latin typeface="Arial"/>
+                <a:cs typeface="Arial"/>
+              </a:rPr>
+              <a:t>Vb</a:t>
+            </a:r>
+            <a:r>
+              <a:rPr lang="en-US" dirty="0">
+                <a:latin typeface="Arial"/>
+                <a:cs typeface="Arial"/>
+              </a:rPr>
+              <a:t>: </a:t>
+            </a:r>
+            <a:r>
+              <a:rPr lang="en-US" dirty="0" err="1">
+                <a:latin typeface="Arial"/>
+                <a:cs typeface="Arial"/>
+              </a:rPr>
+              <a:t>cirkel</a:t>
+            </a:r>
+            <a:r>
+              <a:rPr lang="en-US" dirty="0">
+                <a:latin typeface="Arial"/>
+                <a:cs typeface="Arial"/>
+              </a:rPr>
+              <a:t>, </a:t>
+            </a:r>
+            <a:r>
+              <a:rPr lang="en-US" dirty="0" err="1">
+                <a:latin typeface="Arial"/>
+                <a:cs typeface="Arial"/>
+              </a:rPr>
+              <a:t>driehoek</a:t>
+            </a:r>
+            <a:r>
+              <a:rPr lang="en-US" dirty="0">
+                <a:latin typeface="Arial"/>
+                <a:cs typeface="Arial"/>
+              </a:rPr>
+              <a:t>, </a:t>
+            </a:r>
+            <a:r>
+              <a:rPr lang="en-US" dirty="0" err="1">
+                <a:latin typeface="Arial"/>
+                <a:cs typeface="Arial"/>
+              </a:rPr>
+              <a:t>vijfhoek</a:t>
+            </a:r>
             <a:endParaRPr lang="en-US" dirty="0">
               <a:latin typeface="Arial"/>
               <a:cs typeface="Arial"/>
             </a:endParaRPr>
           </a:p>
           <a:p>
+            <a:r>
+              <a:rPr lang="en-US" dirty="0" err="1">
+                <a:latin typeface="Arial"/>
+                <a:cs typeface="Arial"/>
+              </a:rPr>
+              <a:t>Verschillende</a:t>
+            </a:r>
+            <a:r>
+              <a:rPr lang="en-US" dirty="0">
+                <a:latin typeface="Arial"/>
+                <a:cs typeface="Arial"/>
+              </a:rPr>
+              <a:t> </a:t>
+            </a:r>
+            <a:r>
+              <a:rPr lang="en-US" dirty="0" err="1">
+                <a:latin typeface="Arial"/>
+                <a:cs typeface="Arial"/>
+              </a:rPr>
+              <a:t>waarden</a:t>
+            </a:r>
+            <a:r>
+              <a:rPr lang="en-US" dirty="0">
+                <a:latin typeface="Arial"/>
+                <a:cs typeface="Arial"/>
+              </a:rPr>
+              <a:t> </a:t>
+            </a:r>
+            <a:r>
+              <a:rPr lang="en-US" dirty="0" err="1">
+                <a:latin typeface="Arial"/>
+                <a:cs typeface="Arial"/>
+              </a:rPr>
+              <a:t>voor</a:t>
+            </a:r>
+            <a:r>
+              <a:rPr lang="en-US" dirty="0">
+                <a:latin typeface="Arial"/>
+                <a:cs typeface="Arial"/>
+              </a:rPr>
+              <a:t> </a:t>
+            </a:r>
+            <a:r>
+              <a:rPr lang="en-US" dirty="0" err="1">
+                <a:latin typeface="Arial"/>
+                <a:cs typeface="Arial"/>
+              </a:rPr>
+              <a:t>metaparameters</a:t>
+            </a:r>
+          </a:p>
+          <a:p>
             <a:endParaRPr lang="en-US" dirty="0">
               <a:latin typeface="Arial"/>
               <a:cs typeface="Arial"/>
@@ -6851,6 +6846,18 @@
             </a:endParaRPr>
           </a:p>
           <a:p>
+            <a:endParaRPr lang="en-US" dirty="0">
+              <a:latin typeface="Arial"/>
+              <a:cs typeface="Arial"/>
+            </a:endParaRPr>
+          </a:p>
+          <a:p>
+            <a:endParaRPr lang="en-US" dirty="0">
+              <a:latin typeface="Arial"/>
+              <a:cs typeface="Arial"/>
+            </a:endParaRPr>
+          </a:p>
+          <a:p>
             <a:r>
               <a:rPr lang="en-US" dirty="0">
                 <a:latin typeface="Arial"/>
@@ -6865,23 +6872,35 @@
               </a:rPr>
               <a:t>isoleren</a:t>
             </a:r>
-          </a:p>
-          <a:p>
             <a:r>
               <a:rPr lang="en-US" dirty="0">
                 <a:latin typeface="Arial"/>
                 <a:cs typeface="Arial"/>
               </a:rPr>
-              <a:t>Andere (meta)parameters constant </a:t>
+              <a:t>: </a:t>
             </a:r>
             <a:r>
               <a:rPr lang="en-US" dirty="0" err="1">
                 <a:latin typeface="Arial"/>
                 <a:cs typeface="Arial"/>
               </a:rPr>
+              <a:t>andere</a:t>
+            </a:r>
+            <a:r>
+              <a:rPr lang="en-US" dirty="0">
+                <a:latin typeface="Arial"/>
+                <a:cs typeface="Arial"/>
+              </a:rPr>
+              <a:t> (meta)parameters constant </a:t>
+            </a:r>
+            <a:r>
+              <a:rPr lang="en-US" dirty="0" err="1">
+                <a:latin typeface="Arial"/>
+                <a:cs typeface="Arial"/>
+              </a:rPr>
               <a:t>houden</a:t>
             </a:r>
-            <a:endParaRPr lang="en-US" dirty="0" err="1">
+            <a:endParaRPr lang="en-US" dirty="0">
               <a:cs typeface="Arial"/>
             </a:endParaRPr>
           </a:p>

</xml_diff>